<commit_message>
slides adjusted - slide 12
</commit_message>
<xml_diff>
--- a/folien/grammar.pptx
+++ b/folien/grammar.pptx
@@ -1073,7 +1073,7 @@
         </p:nvSpPr>
         <p:spPr>
           <a:xfrm>
-            <a:off x="381300" y="685800"/>
+            <a:off x="381000" y="685800"/>
             <a:ext cx="6096000" cy="3429000"/>
           </a:xfrm>
           <a:custGeom>
@@ -11145,7 +11145,7 @@
               <a:buNone/>
             </a:pPr>
             <a:r>
-              <a:rPr lang="de" sz="1300" b="1">
+              <a:rPr lang="de" sz="1300" b="1" dirty="0">
                 <a:latin typeface="Roboto Mono"/>
                 <a:ea typeface="Roboto Mono"/>
                 <a:cs typeface="Roboto Mono"/>
@@ -11154,7 +11154,7 @@
               <a:t>grammar</a:t>
             </a:r>
             <a:r>
-              <a:rPr lang="de" sz="1300">
+              <a:rPr lang="de" sz="1300" dirty="0">
                 <a:latin typeface="Roboto Mono"/>
                 <a:ea typeface="Roboto Mono"/>
                 <a:cs typeface="Roboto Mono"/>
@@ -11162,7 +11162,7 @@
               </a:rPr>
               <a:t> SD {</a:t>
             </a:r>
-            <a:endParaRPr sz="1300">
+            <a:endParaRPr sz="1300" dirty="0">
               <a:latin typeface="Roboto Mono"/>
               <a:ea typeface="Roboto Mono"/>
               <a:cs typeface="Roboto Mono"/>
@@ -11179,7 +11179,7 @@
               </a:spcAft>
               <a:buNone/>
             </a:pPr>
-            <a:endParaRPr sz="1300">
+            <a:endParaRPr sz="1300" dirty="0">
               <a:latin typeface="Roboto Mono"/>
               <a:ea typeface="Roboto Mono"/>
               <a:cs typeface="Roboto Mono"/>
@@ -11197,7 +11197,7 @@
               <a:buNone/>
             </a:pPr>
             <a:r>
-              <a:rPr lang="de" sz="1300">
+              <a:rPr lang="de" sz="1300" dirty="0">
                 <a:latin typeface="Roboto Mono"/>
                 <a:ea typeface="Roboto Mono"/>
                 <a:cs typeface="Roboto Mono"/>
@@ -11206,7 +11206,7 @@
               <a:t>  BasicObjectDeclaration </a:t>
             </a:r>
             <a:r>
-              <a:rPr lang="de" sz="1300" b="1">
+              <a:rPr lang="de" sz="1300" b="1" dirty="0">
                 <a:latin typeface="Roboto Mono"/>
                 <a:ea typeface="Roboto Mono"/>
                 <a:cs typeface="Roboto Mono"/>
@@ -11215,7 +11215,7 @@
               <a:t>implements</a:t>
             </a:r>
             <a:r>
-              <a:rPr lang="de" sz="1300">
+              <a:rPr lang="de" sz="1300" dirty="0">
                 <a:latin typeface="Roboto Mono"/>
                 <a:ea typeface="Roboto Mono"/>
                 <a:cs typeface="Roboto Mono"/>
@@ -11223,7 +11223,7 @@
               </a:rPr>
               <a:t> ObjectDeclaration =</a:t>
             </a:r>
-            <a:endParaRPr sz="1300">
+            <a:endParaRPr sz="1300" dirty="0">
               <a:latin typeface="Roboto Mono"/>
               <a:ea typeface="Roboto Mono"/>
               <a:cs typeface="Roboto Mono"/>
@@ -11246,7 +11246,7 @@
               <a:buNone/>
             </a:pPr>
             <a:r>
-              <a:rPr lang="de" sz="1300">
+              <a:rPr lang="de" sz="1300" dirty="0">
                 <a:latin typeface="Roboto Mono"/>
                 <a:ea typeface="Roboto Mono"/>
                 <a:cs typeface="Roboto Mono"/>
@@ -11254,7 +11254,7 @@
               </a:rPr>
               <a:t>    	Name</a:t>
             </a:r>
-            <a:endParaRPr sz="1300">
+            <a:endParaRPr sz="1300" dirty="0">
               <a:latin typeface="Roboto Mono"/>
               <a:ea typeface="Roboto Mono"/>
               <a:cs typeface="Roboto Mono"/>
@@ -11277,7 +11277,7 @@
               <a:buNone/>
             </a:pPr>
             <a:r>
-              <a:rPr lang="de" sz="1300">
+              <a:rPr lang="de" sz="1300" dirty="0">
                 <a:latin typeface="Roboto Mono"/>
                 <a:ea typeface="Roboto Mono"/>
                 <a:cs typeface="Roboto Mono"/>
@@ -11286,7 +11286,7 @@
               <a:t>  </a:t>
             </a:r>
             <a:r>
-              <a:rPr lang="de" sz="1300" b="1">
+              <a:rPr lang="de" sz="1300" b="1" dirty="0">
                 <a:latin typeface="Roboto Mono"/>
                 <a:ea typeface="Roboto Mono"/>
                 <a:cs typeface="Roboto Mono"/>
@@ -11294,7 +11294,7 @@
               </a:rPr>
               <a:t>;</a:t>
             </a:r>
-            <a:endParaRPr sz="1300" b="1">
+            <a:endParaRPr sz="1300" b="1" dirty="0">
               <a:latin typeface="Roboto Mono"/>
               <a:ea typeface="Roboto Mono"/>
               <a:cs typeface="Roboto Mono"/>
@@ -11316,7 +11316,7 @@
               <a:buFont typeface="Arial"/>
               <a:buNone/>
             </a:pPr>
-            <a:endParaRPr sz="1300">
+            <a:endParaRPr sz="1300" dirty="0">
               <a:latin typeface="Roboto Mono"/>
               <a:ea typeface="Roboto Mono"/>
               <a:cs typeface="Roboto Mono"/>
@@ -11339,7 +11339,7 @@
               <a:buNone/>
             </a:pPr>
             <a:r>
-              <a:rPr lang="de" sz="1300">
+              <a:rPr lang="de" sz="1300" dirty="0">
                 <a:latin typeface="Roboto Mono"/>
                 <a:ea typeface="Roboto Mono"/>
                 <a:cs typeface="Roboto Mono"/>
@@ -11348,7 +11348,7 @@
               <a:t>  ConcreteObjectDeclaration </a:t>
             </a:r>
             <a:r>
-              <a:rPr lang="de" sz="1300" b="1">
+              <a:rPr lang="de" sz="1300" b="1" dirty="0">
                 <a:latin typeface="Roboto Mono"/>
                 <a:ea typeface="Roboto Mono"/>
                 <a:cs typeface="Roboto Mono"/>
@@ -11357,7 +11357,7 @@
               <a:t>implements</a:t>
             </a:r>
             <a:r>
-              <a:rPr lang="de" sz="1300">
+              <a:rPr lang="de" sz="1300" dirty="0">
                 <a:latin typeface="Roboto Mono"/>
                 <a:ea typeface="Roboto Mono"/>
                 <a:cs typeface="Roboto Mono"/>
@@ -11365,7 +11365,7 @@
               </a:rPr>
               <a:t> ObjectDeclaration =</a:t>
             </a:r>
-            <a:endParaRPr sz="1300">
+            <a:endParaRPr sz="1300" dirty="0">
               <a:latin typeface="Roboto Mono"/>
               <a:ea typeface="Roboto Mono"/>
               <a:cs typeface="Roboto Mono"/>
@@ -11388,7 +11388,7 @@
               <a:buNone/>
             </a:pPr>
             <a:r>
-              <a:rPr lang="de" sz="1300">
+              <a:rPr lang="de" sz="1300" dirty="0">
                 <a:latin typeface="Roboto Mono"/>
                 <a:ea typeface="Roboto Mono"/>
                 <a:cs typeface="Roboto Mono"/>
@@ -11397,7 +11397,7 @@
               <a:t>    	Name </a:t>
             </a:r>
             <a:r>
-              <a:rPr lang="de" sz="1300">
+              <a:rPr lang="de" sz="1300" dirty="0">
                 <a:solidFill>
                   <a:schemeClr val="accent3"/>
                 </a:solidFill>
@@ -11409,7 +11409,7 @@
               <a:t>":"</a:t>
             </a:r>
             <a:r>
-              <a:rPr lang="de" sz="1300">
+              <a:rPr lang="de" sz="1300" dirty="0">
                 <a:latin typeface="Roboto Mono"/>
                 <a:ea typeface="Roboto Mono"/>
                 <a:cs typeface="Roboto Mono"/>
@@ -11417,7 +11417,7 @@
               </a:rPr>
               <a:t> MCObjectType</a:t>
             </a:r>
-            <a:endParaRPr sz="1300">
+            <a:endParaRPr sz="1300" dirty="0">
               <a:latin typeface="Roboto Mono"/>
               <a:ea typeface="Roboto Mono"/>
               <a:cs typeface="Roboto Mono"/>
@@ -11440,7 +11440,7 @@
               <a:buNone/>
             </a:pPr>
             <a:r>
-              <a:rPr lang="de" sz="1300">
+              <a:rPr lang="de" sz="1300" dirty="0">
                 <a:latin typeface="Roboto Mono"/>
                 <a:ea typeface="Roboto Mono"/>
                 <a:cs typeface="Roboto Mono"/>
@@ -11449,7 +11449,7 @@
               <a:t>  </a:t>
             </a:r>
             <a:r>
-              <a:rPr lang="de" sz="1300" b="1">
+              <a:rPr lang="de" sz="1300" b="1" dirty="0">
                 <a:latin typeface="Roboto Mono"/>
                 <a:ea typeface="Roboto Mono"/>
                 <a:cs typeface="Roboto Mono"/>
@@ -11457,7 +11457,7 @@
               </a:rPr>
               <a:t>;</a:t>
             </a:r>
-            <a:endParaRPr sz="1300" b="1">
+            <a:endParaRPr sz="1300" b="1" dirty="0">
               <a:latin typeface="Roboto Mono"/>
               <a:ea typeface="Roboto Mono"/>
               <a:cs typeface="Roboto Mono"/>
@@ -11479,7 +11479,7 @@
               <a:buFont typeface="Arial"/>
               <a:buNone/>
             </a:pPr>
-            <a:endParaRPr sz="1300">
+            <a:endParaRPr sz="1300" dirty="0">
               <a:latin typeface="Roboto Mono"/>
               <a:ea typeface="Roboto Mono"/>
               <a:cs typeface="Roboto Mono"/>
@@ -11502,7 +11502,7 @@
               <a:buNone/>
             </a:pPr>
             <a:r>
-              <a:rPr lang="de" sz="1300">
+              <a:rPr lang="de" sz="1300" dirty="0">
                 <a:latin typeface="Roboto Mono"/>
                 <a:ea typeface="Roboto Mono"/>
                 <a:cs typeface="Roboto Mono"/>
@@ -11511,7 +11511,7 @@
               <a:t>  AnonymousObjectDeclaration </a:t>
             </a:r>
             <a:r>
-              <a:rPr lang="de" sz="1300" b="1">
+              <a:rPr lang="de" sz="1300" b="1" dirty="0">
                 <a:latin typeface="Roboto Mono"/>
                 <a:ea typeface="Roboto Mono"/>
                 <a:cs typeface="Roboto Mono"/>
@@ -11520,7 +11520,7 @@
               <a:t>implements</a:t>
             </a:r>
             <a:r>
-              <a:rPr lang="de" sz="1300">
+              <a:rPr lang="de" sz="1300" dirty="0">
                 <a:latin typeface="Roboto Mono"/>
                 <a:ea typeface="Roboto Mono"/>
                 <a:cs typeface="Roboto Mono"/>
@@ -11528,7 +11528,7 @@
               </a:rPr>
               <a:t> ObjectDeclaration =</a:t>
             </a:r>
-            <a:endParaRPr sz="1300">
+            <a:endParaRPr sz="1300" dirty="0">
               <a:latin typeface="Roboto Mono"/>
               <a:ea typeface="Roboto Mono"/>
               <a:cs typeface="Roboto Mono"/>
@@ -11551,7 +11551,7 @@
               <a:buNone/>
             </a:pPr>
             <a:r>
-              <a:rPr lang="de" sz="1300">
+              <a:rPr lang="de" sz="1300" dirty="0">
                 <a:latin typeface="Roboto Mono"/>
                 <a:ea typeface="Roboto Mono"/>
                 <a:cs typeface="Roboto Mono"/>
@@ -11560,7 +11560,7 @@
               <a:t>    	</a:t>
             </a:r>
             <a:r>
-              <a:rPr lang="de" sz="1300">
+              <a:rPr lang="de" sz="1300" dirty="0">
                 <a:solidFill>
                   <a:schemeClr val="accent3"/>
                 </a:solidFill>
@@ -11572,16 +11572,276 @@
               <a:t>":"</a:t>
             </a:r>
             <a:r>
-              <a:rPr lang="de" sz="1300">
-                <a:latin typeface="Roboto Mono"/>
-                <a:ea typeface="Roboto Mono"/>
-                <a:cs typeface="Roboto Mono"/>
-                <a:sym typeface="Roboto Mono"/>
-              </a:rPr>
-              <a:t> Name </a:t>
-            </a:r>
-            <a:r>
-              <a:rPr lang="de" sz="1300">
+              <a:rPr lang="de" sz="1300" dirty="0">
+                <a:latin typeface="Roboto Mono"/>
+                <a:ea typeface="Roboto Mono"/>
+                <a:cs typeface="Roboto Mono"/>
+                <a:sym typeface="Roboto Mono"/>
+              </a:rPr>
+              <a:t> </a:t>
+            </a:r>
+            <a:r>
+              <a:rPr lang="de" sz="1300" dirty="0">
+                <a:solidFill>
+                  <a:schemeClr val="tx1"/>
+                </a:solidFill>
+                <a:latin typeface="Roboto Mono"/>
+                <a:ea typeface="Roboto Mono"/>
+                <a:cs typeface="Roboto Mono"/>
+                <a:sym typeface="Roboto Mono"/>
+              </a:rPr>
+              <a:t>MCObjectType</a:t>
+            </a:r>
+            <a:endParaRPr sz="1300" dirty="0">
+              <a:solidFill>
+                <a:schemeClr val="tx1"/>
+              </a:solidFill>
+              <a:latin typeface="Roboto Mono"/>
+              <a:ea typeface="Roboto Mono"/>
+              <a:cs typeface="Roboto Mono"/>
+              <a:sym typeface="Roboto Mono"/>
+            </a:endParaRPr>
+          </a:p>
+          <a:p>
+            <a:pPr marL="0" marR="0" lvl="0" indent="0" algn="l" rtl="0">
+              <a:spcBef>
+                <a:spcPts val="0"/>
+              </a:spcBef>
+              <a:spcAft>
+                <a:spcPts val="0"/>
+              </a:spcAft>
+              <a:buClr>
+                <a:schemeClr val="dk1"/>
+              </a:buClr>
+              <a:buSzPts val="1100"/>
+              <a:buFont typeface="Arial"/>
+              <a:buNone/>
+            </a:pPr>
+            <a:r>
+              <a:rPr lang="de" sz="1300" dirty="0">
+                <a:latin typeface="Roboto Mono"/>
+                <a:ea typeface="Roboto Mono"/>
+                <a:cs typeface="Roboto Mono"/>
+                <a:sym typeface="Roboto Mono"/>
+              </a:rPr>
+              <a:t>  </a:t>
+            </a:r>
+            <a:r>
+              <a:rPr lang="de" sz="1300" b="1" dirty="0">
+                <a:latin typeface="Roboto Mono"/>
+                <a:ea typeface="Roboto Mono"/>
+                <a:cs typeface="Roboto Mono"/>
+                <a:sym typeface="Roboto Mono"/>
+              </a:rPr>
+              <a:t>;</a:t>
+            </a:r>
+            <a:endParaRPr sz="1300" b="1" dirty="0">
+              <a:latin typeface="Roboto Mono"/>
+              <a:ea typeface="Roboto Mono"/>
+              <a:cs typeface="Roboto Mono"/>
+              <a:sym typeface="Roboto Mono"/>
+            </a:endParaRPr>
+          </a:p>
+          <a:p>
+            <a:pPr marL="0" marR="0" lvl="0" indent="0" algn="l" rtl="0">
+              <a:spcBef>
+                <a:spcPts val="0"/>
+              </a:spcBef>
+              <a:spcAft>
+                <a:spcPts val="0"/>
+              </a:spcAft>
+              <a:buClr>
+                <a:schemeClr val="dk1"/>
+              </a:buClr>
+              <a:buSzPts val="1100"/>
+              <a:buFont typeface="Arial"/>
+              <a:buNone/>
+            </a:pPr>
+            <a:endParaRPr sz="1300" dirty="0">
+              <a:latin typeface="Roboto Mono"/>
+              <a:ea typeface="Roboto Mono"/>
+              <a:cs typeface="Roboto Mono"/>
+              <a:sym typeface="Roboto Mono"/>
+            </a:endParaRPr>
+          </a:p>
+          <a:p>
+            <a:pPr marL="0" marR="0" lvl="0" indent="0" algn="l" rtl="0">
+              <a:spcBef>
+                <a:spcPts val="0"/>
+              </a:spcBef>
+              <a:spcAft>
+                <a:spcPts val="0"/>
+              </a:spcAft>
+              <a:buClr>
+                <a:schemeClr val="dk1"/>
+              </a:buClr>
+              <a:buSzPts val="1100"/>
+              <a:buFont typeface="Arial"/>
+              <a:buNone/>
+            </a:pPr>
+            <a:r>
+              <a:rPr lang="de" sz="1300" dirty="0">
+                <a:latin typeface="Roboto Mono"/>
+                <a:ea typeface="Roboto Mono"/>
+                <a:cs typeface="Roboto Mono"/>
+                <a:sym typeface="Roboto Mono"/>
+              </a:rPr>
+              <a:t>  ClassObjectDeclaration </a:t>
+            </a:r>
+            <a:r>
+              <a:rPr lang="de" sz="1300" b="1" dirty="0">
+                <a:latin typeface="Roboto Mono"/>
+                <a:ea typeface="Roboto Mono"/>
+                <a:cs typeface="Roboto Mono"/>
+                <a:sym typeface="Roboto Mono"/>
+              </a:rPr>
+              <a:t>implements</a:t>
+            </a:r>
+            <a:r>
+              <a:rPr lang="de" sz="1300" dirty="0">
+                <a:latin typeface="Roboto Mono"/>
+                <a:ea typeface="Roboto Mono"/>
+                <a:cs typeface="Roboto Mono"/>
+                <a:sym typeface="Roboto Mono"/>
+              </a:rPr>
+              <a:t> ObjectDeclaration =</a:t>
+            </a:r>
+            <a:endParaRPr sz="1300" dirty="0">
+              <a:latin typeface="Roboto Mono"/>
+              <a:ea typeface="Roboto Mono"/>
+              <a:cs typeface="Roboto Mono"/>
+              <a:sym typeface="Roboto Mono"/>
+            </a:endParaRPr>
+          </a:p>
+          <a:p>
+            <a:pPr marL="0" marR="0" lvl="0" indent="0" algn="l" rtl="0">
+              <a:spcBef>
+                <a:spcPts val="0"/>
+              </a:spcBef>
+              <a:spcAft>
+                <a:spcPts val="0"/>
+              </a:spcAft>
+              <a:buClr>
+                <a:schemeClr val="dk1"/>
+              </a:buClr>
+              <a:buSzPts val="1100"/>
+              <a:buFont typeface="Arial"/>
+              <a:buNone/>
+            </a:pPr>
+            <a:r>
+              <a:rPr lang="de" sz="1300" dirty="0">
+                <a:latin typeface="Roboto Mono"/>
+                <a:ea typeface="Roboto Mono"/>
+                <a:cs typeface="Roboto Mono"/>
+                <a:sym typeface="Roboto Mono"/>
+              </a:rPr>
+              <a:t>    	</a:t>
+            </a:r>
+            <a:r>
+              <a:rPr lang="de" sz="1300" dirty="0">
+                <a:solidFill>
+                  <a:schemeClr val="accent3"/>
+                </a:solidFill>
+                <a:latin typeface="Roboto Mono"/>
+                <a:ea typeface="Roboto Mono"/>
+                <a:cs typeface="Roboto Mono"/>
+                <a:sym typeface="Roboto Mono"/>
+              </a:rPr>
+              <a:t>"class"</a:t>
+            </a:r>
+            <a:r>
+              <a:rPr lang="de" sz="1300" dirty="0">
+                <a:latin typeface="Roboto Mono"/>
+                <a:ea typeface="Roboto Mono"/>
+                <a:cs typeface="Roboto Mono"/>
+                <a:sym typeface="Roboto Mono"/>
+              </a:rPr>
+              <a:t> </a:t>
+            </a:r>
+            <a:r>
+              <a:rPr lang="de" sz="1300" dirty="0">
+                <a:solidFill>
+                  <a:schemeClr val="tx1"/>
+                </a:solidFill>
+                <a:latin typeface="Roboto Mono"/>
+                <a:ea typeface="Roboto Mono"/>
+                <a:cs typeface="Roboto Mono"/>
+                <a:sym typeface="Roboto Mono"/>
+              </a:rPr>
+              <a:t>MCObjectType</a:t>
+            </a:r>
+            <a:endParaRPr sz="1300" dirty="0">
+              <a:solidFill>
+                <a:schemeClr val="tx1"/>
+              </a:solidFill>
+              <a:latin typeface="Roboto Mono"/>
+              <a:ea typeface="Roboto Mono"/>
+              <a:cs typeface="Roboto Mono"/>
+              <a:sym typeface="Roboto Mono"/>
+            </a:endParaRPr>
+          </a:p>
+          <a:p>
+            <a:pPr marL="0" marR="0" lvl="0" indent="0" algn="l" rtl="0">
+              <a:spcBef>
+                <a:spcPts val="0"/>
+              </a:spcBef>
+              <a:spcAft>
+                <a:spcPts val="0"/>
+              </a:spcAft>
+              <a:buNone/>
+            </a:pPr>
+            <a:r>
+              <a:rPr lang="de" sz="1300" dirty="0">
+                <a:latin typeface="Roboto Mono"/>
+                <a:ea typeface="Roboto Mono"/>
+                <a:cs typeface="Roboto Mono"/>
+                <a:sym typeface="Roboto Mono"/>
+              </a:rPr>
+              <a:t>  </a:t>
+            </a:r>
+            <a:r>
+              <a:rPr lang="de" sz="1300" b="1" dirty="0">
+                <a:latin typeface="Roboto Mono"/>
+                <a:ea typeface="Roboto Mono"/>
+                <a:cs typeface="Roboto Mono"/>
+                <a:sym typeface="Roboto Mono"/>
+              </a:rPr>
+              <a:t>;</a:t>
+            </a:r>
+            <a:r>
+              <a:rPr lang="de" sz="1300" dirty="0">
+                <a:solidFill>
+                  <a:schemeClr val="accent3"/>
+                </a:solidFill>
+                <a:latin typeface="Roboto Mono"/>
+                <a:ea typeface="Roboto Mono"/>
+                <a:cs typeface="Roboto Mono"/>
+                <a:sym typeface="Roboto Mono"/>
+              </a:rPr>
+              <a:t>  </a:t>
+            </a:r>
+            <a:endParaRPr sz="1300" dirty="0">
+              <a:solidFill>
+                <a:schemeClr val="accent3"/>
+              </a:solidFill>
+              <a:latin typeface="Roboto Mono"/>
+              <a:ea typeface="Roboto Mono"/>
+              <a:cs typeface="Roboto Mono"/>
+              <a:sym typeface="Roboto Mono"/>
+            </a:endParaRPr>
+          </a:p>
+          <a:p>
+            <a:pPr marL="0" marR="0" lvl="0" indent="0" algn="l" rtl="0">
+              <a:spcBef>
+                <a:spcPts val="0"/>
+              </a:spcBef>
+              <a:spcAft>
+                <a:spcPts val="0"/>
+              </a:spcAft>
+              <a:buNone/>
+            </a:pPr>
+            <a:r>
+              <a:rPr lang="de" sz="1300" dirty="0">
                 <a:solidFill>
                   <a:srgbClr val="666666"/>
                 </a:solidFill>
@@ -11590,9 +11850,9 @@
                 <a:cs typeface="Roboto Mono"/>
                 <a:sym typeface="Roboto Mono"/>
               </a:rPr>
-              <a:t>// ":" MCObjectType</a:t>
-            </a:r>
-            <a:endParaRPr sz="1300">
+              <a:t>  // ...</a:t>
+            </a:r>
+            <a:endParaRPr sz="1300" dirty="0">
               <a:solidFill>
                 <a:srgbClr val="666666"/>
               </a:solidFill>
@@ -11610,270 +11870,10 @@
               <a:spcAft>
                 <a:spcPts val="0"/>
               </a:spcAft>
-              <a:buClr>
-                <a:schemeClr val="dk1"/>
-              </a:buClr>
-              <a:buSzPts val="1100"/>
-              <a:buFont typeface="Arial"/>
-              <a:buNone/>
-            </a:pPr>
-            <a:r>
-              <a:rPr lang="de" sz="1300">
-                <a:latin typeface="Roboto Mono"/>
-                <a:ea typeface="Roboto Mono"/>
-                <a:cs typeface="Roboto Mono"/>
-                <a:sym typeface="Roboto Mono"/>
-              </a:rPr>
-              <a:t>  </a:t>
-            </a:r>
-            <a:r>
-              <a:rPr lang="de" sz="1300" b="1">
-                <a:latin typeface="Roboto Mono"/>
-                <a:ea typeface="Roboto Mono"/>
-                <a:cs typeface="Roboto Mono"/>
-                <a:sym typeface="Roboto Mono"/>
-              </a:rPr>
-              <a:t>;</a:t>
-            </a:r>
-            <a:endParaRPr sz="1300" b="1">
-              <a:latin typeface="Roboto Mono"/>
-              <a:ea typeface="Roboto Mono"/>
-              <a:cs typeface="Roboto Mono"/>
-              <a:sym typeface="Roboto Mono"/>
-            </a:endParaRPr>
-          </a:p>
-          <a:p>
-            <a:pPr marL="0" marR="0" lvl="0" indent="0" algn="l" rtl="0">
-              <a:spcBef>
-                <a:spcPts val="0"/>
-              </a:spcBef>
-              <a:spcAft>
-                <a:spcPts val="0"/>
-              </a:spcAft>
-              <a:buClr>
-                <a:schemeClr val="dk1"/>
-              </a:buClr>
-              <a:buSzPts val="1100"/>
-              <a:buFont typeface="Arial"/>
-              <a:buNone/>
-            </a:pPr>
-            <a:endParaRPr sz="1300">
-              <a:latin typeface="Roboto Mono"/>
-              <a:ea typeface="Roboto Mono"/>
-              <a:cs typeface="Roboto Mono"/>
-              <a:sym typeface="Roboto Mono"/>
-            </a:endParaRPr>
-          </a:p>
-          <a:p>
-            <a:pPr marL="0" marR="0" lvl="0" indent="0" algn="l" rtl="0">
-              <a:spcBef>
-                <a:spcPts val="0"/>
-              </a:spcBef>
-              <a:spcAft>
-                <a:spcPts val="0"/>
-              </a:spcAft>
-              <a:buClr>
-                <a:schemeClr val="dk1"/>
-              </a:buClr>
-              <a:buSzPts val="1100"/>
-              <a:buFont typeface="Arial"/>
-              <a:buNone/>
-            </a:pPr>
-            <a:r>
-              <a:rPr lang="de" sz="1300">
-                <a:latin typeface="Roboto Mono"/>
-                <a:ea typeface="Roboto Mono"/>
-                <a:cs typeface="Roboto Mono"/>
-                <a:sym typeface="Roboto Mono"/>
-              </a:rPr>
-              <a:t>  ClassObjectDeclaration </a:t>
-            </a:r>
-            <a:r>
-              <a:rPr lang="de" sz="1300" b="1">
-                <a:latin typeface="Roboto Mono"/>
-                <a:ea typeface="Roboto Mono"/>
-                <a:cs typeface="Roboto Mono"/>
-                <a:sym typeface="Roboto Mono"/>
-              </a:rPr>
-              <a:t>implements</a:t>
-            </a:r>
-            <a:r>
-              <a:rPr lang="de" sz="1300">
-                <a:latin typeface="Roboto Mono"/>
-                <a:ea typeface="Roboto Mono"/>
-                <a:cs typeface="Roboto Mono"/>
-                <a:sym typeface="Roboto Mono"/>
-              </a:rPr>
-              <a:t> ObjectDeclaration =</a:t>
-            </a:r>
-            <a:endParaRPr sz="1300">
-              <a:latin typeface="Roboto Mono"/>
-              <a:ea typeface="Roboto Mono"/>
-              <a:cs typeface="Roboto Mono"/>
-              <a:sym typeface="Roboto Mono"/>
-            </a:endParaRPr>
-          </a:p>
-          <a:p>
-            <a:pPr marL="0" marR="0" lvl="0" indent="0" algn="l" rtl="0">
-              <a:spcBef>
-                <a:spcPts val="0"/>
-              </a:spcBef>
-              <a:spcAft>
-                <a:spcPts val="0"/>
-              </a:spcAft>
-              <a:buClr>
-                <a:schemeClr val="dk1"/>
-              </a:buClr>
-              <a:buSzPts val="1100"/>
-              <a:buFont typeface="Arial"/>
-              <a:buNone/>
-            </a:pPr>
-            <a:r>
-              <a:rPr lang="de" sz="1300">
-                <a:latin typeface="Roboto Mono"/>
-                <a:ea typeface="Roboto Mono"/>
-                <a:cs typeface="Roboto Mono"/>
-                <a:sym typeface="Roboto Mono"/>
-              </a:rPr>
-              <a:t>    	</a:t>
-            </a:r>
-            <a:r>
-              <a:rPr lang="de" sz="1300">
-                <a:solidFill>
-                  <a:schemeClr val="accent3"/>
-                </a:solidFill>
-                <a:latin typeface="Roboto Mono"/>
-                <a:ea typeface="Roboto Mono"/>
-                <a:cs typeface="Roboto Mono"/>
-                <a:sym typeface="Roboto Mono"/>
-              </a:rPr>
-              <a:t>"class"</a:t>
-            </a:r>
-            <a:r>
-              <a:rPr lang="de" sz="1300">
-                <a:latin typeface="Roboto Mono"/>
-                <a:ea typeface="Roboto Mono"/>
-                <a:cs typeface="Roboto Mono"/>
-                <a:sym typeface="Roboto Mono"/>
-              </a:rPr>
-              <a:t> Name </a:t>
-            </a:r>
-            <a:r>
-              <a:rPr lang="de" sz="1300">
-                <a:solidFill>
-                  <a:srgbClr val="666666"/>
-                </a:solidFill>
-                <a:latin typeface="Roboto Mono"/>
-                <a:ea typeface="Roboto Mono"/>
-                <a:cs typeface="Roboto Mono"/>
-                <a:sym typeface="Roboto Mono"/>
-              </a:rPr>
-              <a:t>// "class" MCObjectType</a:t>
-            </a:r>
-            <a:endParaRPr sz="1300">
-              <a:solidFill>
-                <a:srgbClr val="666666"/>
-              </a:solidFill>
-              <a:latin typeface="Roboto Mono"/>
-              <a:ea typeface="Roboto Mono"/>
-              <a:cs typeface="Roboto Mono"/>
-              <a:sym typeface="Roboto Mono"/>
-            </a:endParaRPr>
-          </a:p>
-          <a:p>
-            <a:pPr marL="0" marR="0" lvl="0" indent="0" algn="l" rtl="0">
-              <a:spcBef>
-                <a:spcPts val="0"/>
-              </a:spcBef>
-              <a:spcAft>
-                <a:spcPts val="0"/>
-              </a:spcAft>
-              <a:buNone/>
-            </a:pPr>
-            <a:r>
-              <a:rPr lang="de" sz="1300">
-                <a:latin typeface="Roboto Mono"/>
-                <a:ea typeface="Roboto Mono"/>
-                <a:cs typeface="Roboto Mono"/>
-                <a:sym typeface="Roboto Mono"/>
-              </a:rPr>
-              <a:t>  </a:t>
-            </a:r>
-            <a:r>
-              <a:rPr lang="de" sz="1300" b="1">
-                <a:latin typeface="Roboto Mono"/>
-                <a:ea typeface="Roboto Mono"/>
-                <a:cs typeface="Roboto Mono"/>
-                <a:sym typeface="Roboto Mono"/>
-              </a:rPr>
-              <a:t>;</a:t>
-            </a:r>
-            <a:r>
-              <a:rPr lang="de" sz="1300">
-                <a:solidFill>
-                  <a:schemeClr val="accent3"/>
-                </a:solidFill>
-                <a:latin typeface="Roboto Mono"/>
-                <a:ea typeface="Roboto Mono"/>
-                <a:cs typeface="Roboto Mono"/>
-                <a:sym typeface="Roboto Mono"/>
-              </a:rPr>
-              <a:t>  </a:t>
-            </a:r>
-            <a:endParaRPr sz="1300">
-              <a:solidFill>
-                <a:schemeClr val="accent3"/>
-              </a:solidFill>
-              <a:latin typeface="Roboto Mono"/>
-              <a:ea typeface="Roboto Mono"/>
-              <a:cs typeface="Roboto Mono"/>
-              <a:sym typeface="Roboto Mono"/>
-            </a:endParaRPr>
-          </a:p>
-          <a:p>
-            <a:pPr marL="0" marR="0" lvl="0" indent="0" algn="l" rtl="0">
-              <a:spcBef>
-                <a:spcPts val="0"/>
-              </a:spcBef>
-              <a:spcAft>
-                <a:spcPts val="0"/>
-              </a:spcAft>
-              <a:buNone/>
-            </a:pPr>
-            <a:r>
-              <a:rPr lang="de" sz="1300">
-                <a:solidFill>
-                  <a:srgbClr val="666666"/>
-                </a:solidFill>
-                <a:latin typeface="Roboto Mono"/>
-                <a:ea typeface="Roboto Mono"/>
-                <a:cs typeface="Roboto Mono"/>
-                <a:sym typeface="Roboto Mono"/>
-              </a:rPr>
-              <a:t>  // ...</a:t>
-            </a:r>
-            <a:endParaRPr sz="1300">
-              <a:solidFill>
-                <a:srgbClr val="666666"/>
-              </a:solidFill>
-              <a:latin typeface="Roboto Mono"/>
-              <a:ea typeface="Roboto Mono"/>
-              <a:cs typeface="Roboto Mono"/>
-              <a:sym typeface="Roboto Mono"/>
-            </a:endParaRPr>
-          </a:p>
-          <a:p>
-            <a:pPr marL="0" marR="0" lvl="0" indent="0" algn="l" rtl="0">
-              <a:spcBef>
-                <a:spcPts val="0"/>
-              </a:spcBef>
-              <a:spcAft>
-                <a:spcPts val="0"/>
-              </a:spcAft>
-              <a:buNone/>
-            </a:pPr>
-            <a:r>
-              <a:rPr lang="de" sz="1300">
+              <a:buNone/>
+            </a:pPr>
+            <a:r>
+              <a:rPr lang="de" sz="1300" dirty="0">
                 <a:latin typeface="Roboto Mono"/>
                 <a:ea typeface="Roboto Mono"/>
                 <a:cs typeface="Roboto Mono"/>
@@ -11881,7 +11881,7 @@
               </a:rPr>
               <a:t>}</a:t>
             </a:r>
-            <a:endParaRPr sz="1300">
+            <a:endParaRPr sz="1300" dirty="0">
               <a:latin typeface="Roboto Mono"/>
               <a:ea typeface="Roboto Mono"/>
               <a:cs typeface="Roboto Mono"/>
@@ -11926,18 +11926,18 @@
               <a:buChar char="●"/>
             </a:pPr>
             <a:r>
-              <a:rPr lang="de" sz="1300"/>
+              <a:rPr lang="de" sz="1300" dirty="0"/>
               <a:t>Erweiterbarkeit der </a:t>
             </a:r>
             <a:r>
-              <a:rPr lang="de" sz="1300">
+              <a:rPr lang="de" sz="1300" dirty="0">
                 <a:solidFill>
                   <a:srgbClr val="00549F"/>
                 </a:solidFill>
               </a:rPr>
               <a:t>Objekt-Deklarationen</a:t>
             </a:r>
-            <a:endParaRPr sz="1300">
+            <a:endParaRPr sz="1300" dirty="0">
               <a:solidFill>
                 <a:srgbClr val="00549F"/>
               </a:solidFill>
@@ -11953,7 +11953,7 @@
               </a:spcAft>
               <a:buNone/>
             </a:pPr>
-            <a:endParaRPr sz="1300">
+            <a:endParaRPr sz="1300" dirty="0">
               <a:solidFill>
                 <a:srgbClr val="00549F"/>
               </a:solidFill>
@@ -11974,34 +11974,33 @@
               <a:buChar char="●"/>
             </a:pPr>
             <a:r>
-              <a:rPr lang="de" sz="1300">
+              <a:rPr lang="de" sz="1300" dirty="0">
                 <a:solidFill>
                   <a:srgbClr val="000000"/>
                 </a:solidFill>
               </a:rPr>
               <a:t>Jede Objekt-Deklaration induziert ein Symbol</a:t>
             </a:r>
-            <a:endParaRPr sz="1300">
+            <a:endParaRPr sz="1300" dirty="0">
               <a:solidFill>
                 <a:srgbClr val="000000"/>
               </a:solidFill>
             </a:endParaRPr>
           </a:p>
           <a:p>
-            <a:pPr marL="0" lvl="0" indent="0" algn="l" rtl="0">
-              <a:spcBef>
-                <a:spcPts val="0"/>
-              </a:spcBef>
-              <a:spcAft>
-                <a:spcPts val="0"/>
-              </a:spcAft>
-              <a:buNone/>
-            </a:pPr>
-            <a:endParaRPr sz="1300">
-              <a:solidFill>
-                <a:srgbClr val="000000"/>
-              </a:solidFill>
-            </a:endParaRPr>
+            <a:pPr marL="457200" lvl="0" indent="0" algn="l" rtl="0">
+              <a:lnSpc>
+                <a:spcPct val="115000"/>
+              </a:lnSpc>
+              <a:spcBef>
+                <a:spcPts val="0"/>
+              </a:spcBef>
+              <a:spcAft>
+                <a:spcPts val="0"/>
+              </a:spcAft>
+              <a:buNone/>
+            </a:pPr>
+            <a:endParaRPr sz="1300" dirty="0"/>
           </a:p>
           <a:p>
             <a:pPr marL="457200" lvl="0" indent="-311150" algn="l" rtl="0">
@@ -12014,127 +12013,14 @@
               <a:spcAft>
                 <a:spcPts val="0"/>
               </a:spcAft>
-              <a:buClr>
-                <a:schemeClr val="dk1"/>
-              </a:buClr>
               <a:buSzPts val="1300"/>
               <a:buChar char="●"/>
             </a:pPr>
             <a:r>
-              <a:rPr lang="de" sz="1300"/>
-              <a:t>Erlauben wir nur </a:t>
-            </a:r>
-            <a:endParaRPr sz="1300"/>
-          </a:p>
-          <a:p>
-            <a:pPr marL="457200" lvl="0" indent="0" algn="l" rtl="0">
-              <a:lnSpc>
-                <a:spcPct val="115000"/>
-              </a:lnSpc>
-              <a:spcBef>
-                <a:spcPts val="0"/>
-              </a:spcBef>
-              <a:spcAft>
-                <a:spcPts val="0"/>
-              </a:spcAft>
-              <a:buNone/>
-            </a:pPr>
-            <a:r>
-              <a:rPr lang="de" sz="1300">
-                <a:latin typeface="Roboto Mono"/>
-                <a:ea typeface="Roboto Mono"/>
-                <a:cs typeface="Roboto Mono"/>
-                <a:sym typeface="Roboto Mono"/>
-              </a:rPr>
-              <a:t>:C</a:t>
-            </a:r>
-            <a:r>
-              <a:rPr lang="de" sz="1300"/>
-              <a:t>         (Name)</a:t>
-            </a:r>
-            <a:endParaRPr sz="1300"/>
-          </a:p>
-          <a:p>
-            <a:pPr marL="457200" lvl="0" indent="0" algn="l" rtl="0">
-              <a:lnSpc>
-                <a:spcPct val="115000"/>
-              </a:lnSpc>
-              <a:spcBef>
-                <a:spcPts val="0"/>
-              </a:spcBef>
-              <a:spcAft>
-                <a:spcPts val="0"/>
-              </a:spcAft>
-              <a:buNone/>
-            </a:pPr>
-            <a:r>
-              <a:rPr lang="de" sz="1300"/>
-              <a:t>oder auch </a:t>
-            </a:r>
-            <a:endParaRPr sz="1300"/>
-          </a:p>
-          <a:p>
-            <a:pPr marL="457200" lvl="0" indent="0" algn="l" rtl="0">
-              <a:lnSpc>
-                <a:spcPct val="115000"/>
-              </a:lnSpc>
-              <a:spcBef>
-                <a:spcPts val="0"/>
-              </a:spcBef>
-              <a:spcAft>
-                <a:spcPts val="0"/>
-              </a:spcAft>
-              <a:buNone/>
-            </a:pPr>
-            <a:r>
-              <a:rPr lang="de" sz="1300">
-                <a:latin typeface="Roboto Mono"/>
-                <a:ea typeface="Roboto Mono"/>
-                <a:cs typeface="Roboto Mono"/>
-                <a:sym typeface="Roboto Mono"/>
-              </a:rPr>
-              <a:t>:de.C  (MCObjectType)</a:t>
-            </a:r>
-            <a:r>
-              <a:rPr lang="de" sz="1300"/>
-              <a:t>?</a:t>
-            </a:r>
-            <a:endParaRPr sz="1300"/>
-          </a:p>
-          <a:p>
-            <a:pPr marL="457200" lvl="0" indent="0" algn="l" rtl="0">
-              <a:lnSpc>
-                <a:spcPct val="115000"/>
-              </a:lnSpc>
-              <a:spcBef>
-                <a:spcPts val="0"/>
-              </a:spcBef>
-              <a:spcAft>
-                <a:spcPts val="0"/>
-              </a:spcAft>
-              <a:buNone/>
-            </a:pPr>
-            <a:endParaRPr sz="1300"/>
-          </a:p>
-          <a:p>
-            <a:pPr marL="457200" lvl="0" indent="-311150" algn="l" rtl="0">
-              <a:lnSpc>
-                <a:spcPct val="115000"/>
-              </a:lnSpc>
-              <a:spcBef>
-                <a:spcPts val="0"/>
-              </a:spcBef>
-              <a:spcAft>
-                <a:spcPts val="0"/>
-              </a:spcAft>
-              <a:buSzPts val="1300"/>
-              <a:buChar char="●"/>
-            </a:pPr>
-            <a:r>
-              <a:rPr lang="de" sz="1300"/>
+              <a:rPr lang="de" sz="1300" dirty="0"/>
               <a:t>Zwei anonyme Objekte des gleichen Typs verboten?</a:t>
             </a:r>
-            <a:endParaRPr sz="1300"/>
+            <a:endParaRPr sz="1300" dirty="0"/>
           </a:p>
         </p:txBody>
       </p:sp>

</xml_diff>